<commit_message>
added a reference to ppt and readme
</commit_message>
<xml_diff>
--- a/Airline_OnTime_performance_Stats.pptx
+++ b/Airline_OnTime_performance_Stats.pptx
@@ -208,7 +208,7 @@
           <a:p>
             <a:fld id="{46609D4D-7D39-4F2B-9313-3332C0AD795B}" type="datetimeFigureOut">
               <a:rPr lang="en-US" smtClean="0"/>
-              <a:t>4/17/24</a:t>
+              <a:t>4/18/2024</a:t>
             </a:fld>
             <a:endParaRPr lang="en-US"/>
           </a:p>
@@ -1754,7 +1754,7 @@
           <a:p>
             <a:fld id="{5FC588E6-FAC8-4CB8-904E-4C86C516A14A}" type="datetimeFigureOut">
               <a:rPr lang="en-US" smtClean="0"/>
-              <a:t>4/17/24</a:t>
+              <a:t>4/18/2024</a:t>
             </a:fld>
             <a:endParaRPr lang="en-US"/>
           </a:p>
@@ -1962,7 +1962,7 @@
           <a:p>
             <a:fld id="{5FC588E6-FAC8-4CB8-904E-4C86C516A14A}" type="datetimeFigureOut">
               <a:rPr lang="en-US" smtClean="0"/>
-              <a:t>4/17/24</a:t>
+              <a:t>4/18/2024</a:t>
             </a:fld>
             <a:endParaRPr lang="en-US"/>
           </a:p>
@@ -2218,7 +2218,7 @@
           <a:p>
             <a:fld id="{5FC588E6-FAC8-4CB8-904E-4C86C516A14A}" type="datetimeFigureOut">
               <a:rPr lang="en-US" smtClean="0"/>
-              <a:t>4/17/24</a:t>
+              <a:t>4/18/2024</a:t>
             </a:fld>
             <a:endParaRPr lang="en-US"/>
           </a:p>
@@ -2392,7 +2392,7 @@
           <a:p>
             <a:fld id="{5FC588E6-FAC8-4CB8-904E-4C86C516A14A}" type="datetimeFigureOut">
               <a:rPr lang="en-US" smtClean="0"/>
-              <a:t>4/17/24</a:t>
+              <a:t>4/18/2024</a:t>
             </a:fld>
             <a:endParaRPr lang="en-US"/>
           </a:p>
@@ -2735,7 +2735,7 @@
           <a:p>
             <a:fld id="{5FC588E6-FAC8-4CB8-904E-4C86C516A14A}" type="datetimeFigureOut">
               <a:rPr lang="en-US" smtClean="0"/>
-              <a:t>4/17/24</a:t>
+              <a:t>4/18/2024</a:t>
             </a:fld>
             <a:endParaRPr lang="en-US"/>
           </a:p>
@@ -3010,7 +3010,7 @@
           <a:p>
             <a:fld id="{5FC588E6-FAC8-4CB8-904E-4C86C516A14A}" type="datetimeFigureOut">
               <a:rPr lang="en-US" smtClean="0"/>
-              <a:t>4/17/24</a:t>
+              <a:t>4/18/2024</a:t>
             </a:fld>
             <a:endParaRPr lang="en-US"/>
           </a:p>
@@ -3389,7 +3389,7 @@
           <a:p>
             <a:fld id="{5FC588E6-FAC8-4CB8-904E-4C86C516A14A}" type="datetimeFigureOut">
               <a:rPr lang="en-US" smtClean="0"/>
-              <a:t>4/17/24</a:t>
+              <a:t>4/18/2024</a:t>
             </a:fld>
             <a:endParaRPr lang="en-US"/>
           </a:p>
@@ -3507,7 +3507,7 @@
           <a:p>
             <a:fld id="{5FC588E6-FAC8-4CB8-904E-4C86C516A14A}" type="datetimeFigureOut">
               <a:rPr lang="en-US" smtClean="0"/>
-              <a:t>4/17/24</a:t>
+              <a:t>4/18/2024</a:t>
             </a:fld>
             <a:endParaRPr lang="en-US"/>
           </a:p>
@@ -3678,7 +3678,7 @@
           <a:p>
             <a:fld id="{5FC588E6-FAC8-4CB8-904E-4C86C516A14A}" type="datetimeFigureOut">
               <a:rPr lang="en-US" smtClean="0"/>
-              <a:t>4/17/24</a:t>
+              <a:t>4/18/2024</a:t>
             </a:fld>
             <a:endParaRPr lang="en-US"/>
           </a:p>
@@ -4032,7 +4032,7 @@
           <a:p>
             <a:fld id="{5FC588E6-FAC8-4CB8-904E-4C86C516A14A}" type="datetimeFigureOut">
               <a:rPr lang="en-US" smtClean="0"/>
-              <a:t>4/17/24</a:t>
+              <a:t>4/18/2024</a:t>
             </a:fld>
             <a:endParaRPr lang="en-US"/>
           </a:p>
@@ -4414,7 +4414,7 @@
           <a:p>
             <a:fld id="{5FC588E6-FAC8-4CB8-904E-4C86C516A14A}" type="datetimeFigureOut">
               <a:rPr lang="en-US" smtClean="0"/>
-              <a:t>4/17/24</a:t>
+              <a:t>4/18/2024</a:t>
             </a:fld>
             <a:endParaRPr lang="en-US"/>
           </a:p>
@@ -4701,7 +4701,7 @@
           <a:p>
             <a:fld id="{5FC588E6-FAC8-4CB8-904E-4C86C516A14A}" type="datetimeFigureOut">
               <a:rPr lang="en-US" smtClean="0"/>
-              <a:t>4/17/24</a:t>
+              <a:t>4/18/2024</a:t>
             </a:fld>
             <a:endParaRPr lang="en-US"/>
           </a:p>
@@ -5833,75 +5833,64 @@
               <a:rPr lang="en-US" dirty="0">
                 <a:hlinkClick r:id="rId3"/>
               </a:rPr>
-              <a:t>https://</a:t>
-            </a:r>
-            <a:r>
-              <a:rPr lang="en-US" dirty="0" err="1">
-                <a:hlinkClick r:id="rId3"/>
-              </a:rPr>
-              <a:t>www.transtats.bts.gov</a:t>
-            </a:r>
-            <a:r>
-              <a:rPr lang="en-US" dirty="0">
-                <a:hlinkClick r:id="rId3"/>
-              </a:rPr>
-              <a:t>/</a:t>
-            </a:r>
-            <a:r>
-              <a:rPr lang="en-US" dirty="0" err="1">
-                <a:hlinkClick r:id="rId3"/>
-              </a:rPr>
-              <a:t>DatabaseInfo.asp?QO_VQ</a:t>
-            </a:r>
-            <a:r>
-              <a:rPr lang="en-US" dirty="0">
-                <a:hlinkClick r:id="rId3"/>
-              </a:rPr>
-              <a:t>=EFD&amp;Yv0x=D</a:t>
+              <a:t>https://www.transtats.bts.gov/DatabaseInfo.asp?QO_VQ=EFD&amp;Yv0x=D</a:t>
             </a:r>
             <a:endParaRPr lang="en-US" dirty="0"/>
           </a:p>
           <a:p>
             <a:r>
               <a:rPr lang="en-US" dirty="0"/>
-              <a:t>3. Reset index for </a:t>
-            </a:r>
-            <a:r>
-              <a:rPr lang="en-US" dirty="0" err="1"/>
-              <a:t>DataFrame</a:t>
-            </a:r>
-            <a:r>
-              <a:rPr lang="en-US" dirty="0"/>
-              <a:t>: </a:t>
+              <a:t>3. Downcast: </a:t>
             </a:r>
             <a:r>
               <a:rPr lang="en-US" dirty="0">
                 <a:hlinkClick r:id="rId4"/>
               </a:rPr>
-              <a:t>https://stackoverflow.com/questions/20167930/start-index-at-1-for-pandas-dataframe</a:t>
+              <a:t>https://www.educative.io/answers/what-is-the-tonumeric-function-in-pandas</a:t>
             </a:r>
             <a:endParaRPr lang="en-US" dirty="0"/>
           </a:p>
           <a:p>
             <a:r>
               <a:rPr lang="en-US" dirty="0"/>
-              <a:t>4. Seaborn Documentation: </a:t>
+              <a:t>4. Reset index for </a:t>
+            </a:r>
+            <a:r>
+              <a:rPr lang="en-US" dirty="0" err="1"/>
+              <a:t>DataFrame</a:t>
+            </a:r>
+            <a:r>
+              <a:rPr lang="en-US" dirty="0"/>
+              <a:t>: </a:t>
             </a:r>
             <a:r>
               <a:rPr lang="en-US" dirty="0">
                 <a:hlinkClick r:id="rId5"/>
               </a:rPr>
+              <a:t>https://stackoverflow.com/questions/20167930/start-index-at-1-for-pandas-dataframe</a:t>
+            </a:r>
+            <a:endParaRPr lang="en-US" dirty="0"/>
+          </a:p>
+          <a:p>
+            <a:r>
+              <a:rPr lang="en-US" dirty="0"/>
+              <a:t>5. Seaborn Documentation: </a:t>
+            </a:r>
+            <a:r>
+              <a:rPr lang="en-US" dirty="0">
+                <a:hlinkClick r:id="rId6"/>
+              </a:rPr>
               <a:t>https://</a:t>
             </a:r>
             <a:r>
               <a:rPr lang="en-US" dirty="0" err="1">
-                <a:hlinkClick r:id="rId5"/>
+                <a:hlinkClick r:id="rId6"/>
               </a:rPr>
               <a:t>pypi.org</a:t>
             </a:r>
             <a:r>
               <a:rPr lang="en-US" dirty="0">
-                <a:hlinkClick r:id="rId5"/>
+                <a:hlinkClick r:id="rId6"/>
               </a:rPr>
               <a:t>/project/seaborn/</a:t>
             </a:r>
@@ -6780,6 +6769,98 @@
           </a:xfrm>
         </p:spPr>
       </p:pic>
+      <p:sp>
+        <p:nvSpPr>
+          <p:cNvPr id="3" name="Arrow: Down 2">
+            <a:extLst>
+              <a:ext uri="{FF2B5EF4-FFF2-40B4-BE49-F238E27FC236}">
+                <a16:creationId xmlns:a16="http://schemas.microsoft.com/office/drawing/2014/main" id="{651BD90B-EF72-54D1-5BF0-B4533D82AB4B}"/>
+              </a:ext>
+            </a:extLst>
+          </p:cNvPr>
+          <p:cNvSpPr/>
+          <p:nvPr/>
+        </p:nvSpPr>
+        <p:spPr>
+          <a:xfrm>
+            <a:off x="5481983" y="1956904"/>
+            <a:ext cx="194365" cy="441739"/>
+          </a:xfrm>
+          <a:prstGeom prst="downArrow">
+            <a:avLst/>
+          </a:prstGeom>
+        </p:spPr>
+        <p:style>
+          <a:lnRef idx="2">
+            <a:schemeClr val="accent1">
+              <a:shade val="15000"/>
+            </a:schemeClr>
+          </a:lnRef>
+          <a:fillRef idx="1">
+            <a:schemeClr val="accent1"/>
+          </a:fillRef>
+          <a:effectRef idx="0">
+            <a:schemeClr val="accent1"/>
+          </a:effectRef>
+          <a:fontRef idx="minor">
+            <a:schemeClr val="lt1"/>
+          </a:fontRef>
+        </p:style>
+        <p:txBody>
+          <a:bodyPr rtlCol="0" anchor="ctr"/>
+          <a:lstStyle/>
+          <a:p>
+            <a:pPr algn="ctr"/>
+            <a:endParaRPr lang="en-US"/>
+          </a:p>
+        </p:txBody>
+      </p:sp>
+      <p:sp>
+        <p:nvSpPr>
+          <p:cNvPr id="5" name="Arrow: Down 4">
+            <a:extLst>
+              <a:ext uri="{FF2B5EF4-FFF2-40B4-BE49-F238E27FC236}">
+                <a16:creationId xmlns:a16="http://schemas.microsoft.com/office/drawing/2014/main" id="{33307091-2599-975A-40DD-7BA77FCCE122}"/>
+              </a:ext>
+            </a:extLst>
+          </p:cNvPr>
+          <p:cNvSpPr/>
+          <p:nvPr/>
+        </p:nvSpPr>
+        <p:spPr>
+          <a:xfrm>
+            <a:off x="10365409" y="1990034"/>
+            <a:ext cx="194365" cy="441739"/>
+          </a:xfrm>
+          <a:prstGeom prst="downArrow">
+            <a:avLst/>
+          </a:prstGeom>
+        </p:spPr>
+        <p:style>
+          <a:lnRef idx="2">
+            <a:schemeClr val="accent1">
+              <a:shade val="15000"/>
+            </a:schemeClr>
+          </a:lnRef>
+          <a:fillRef idx="1">
+            <a:schemeClr val="accent1"/>
+          </a:fillRef>
+          <a:effectRef idx="0">
+            <a:schemeClr val="accent1"/>
+          </a:effectRef>
+          <a:fontRef idx="minor">
+            <a:schemeClr val="lt1"/>
+          </a:fontRef>
+        </p:style>
+        <p:txBody>
+          <a:bodyPr rtlCol="0" anchor="ctr"/>
+          <a:lstStyle/>
+          <a:p>
+            <a:pPr algn="ctr"/>
+            <a:endParaRPr lang="en-US"/>
+          </a:p>
+        </p:txBody>
+      </p:sp>
     </p:spTree>
     <p:extLst>
       <p:ext uri="{BB962C8B-B14F-4D97-AF65-F5344CB8AC3E}">

</xml_diff>